<commit_message>
Update the figure of datasets
</commit_message>
<xml_diff>
--- a/final project/Part_1-2-4.pptx
+++ b/final project/Part_1-2-4.pptx
@@ -302,7 +302,7 @@
               <a:pPr>
                 <a:defRPr/>
               </a:pPr>
-              <a:t>07/07/2024</a:t>
+              <a:t>08/07/2024</a:t>
             </a:fld>
             <a:endParaRPr lang="en-GB" dirty="0"/>
           </a:p>
@@ -395,7 +395,7 @@
               <a:pPr>
                 <a:defRPr/>
               </a:pPr>
-              <a:t>‹Nr.›</a:t>
+              <a:t>‹#›</a:t>
             </a:fld>
             <a:endParaRPr lang="en-GB"/>
           </a:p>
@@ -521,7 +521,7 @@
               <a:pPr>
                 <a:defRPr/>
               </a:pPr>
-              <a:t>07/07/2024</a:t>
+              <a:t>08/07/2024</a:t>
             </a:fld>
             <a:endParaRPr lang="en-GB"/>
           </a:p>
@@ -713,7 +713,7 @@
               <a:pPr>
                 <a:defRPr/>
               </a:pPr>
-              <a:t>‹Nr.›</a:t>
+              <a:t>‹#›</a:t>
             </a:fld>
             <a:endParaRPr lang="en-GB"/>
           </a:p>
@@ -1109,7 +1109,7 @@
             <a:fld id="{CE58CB1E-F828-4F11-99E0-327109AF9DA4}" type="slidenum">
               <a:rPr lang="de-DE" smtClean="0"/>
               <a:pPr/>
-              <a:t>‹Nr.›</a:t>
+              <a:t>‹#›</a:t>
             </a:fld>
             <a:endParaRPr lang="de-DE" dirty="0"/>
           </a:p>
@@ -1270,7 +1270,7 @@
             <a:fld id="{CE58CB1E-F828-4F11-99E0-327109AF9DA4}" type="slidenum">
               <a:rPr lang="de-DE" smtClean="0"/>
               <a:pPr/>
-              <a:t>‹Nr.›</a:t>
+              <a:t>‹#›</a:t>
             </a:fld>
             <a:endParaRPr lang="de-DE" dirty="0"/>
           </a:p>
@@ -1489,7 +1489,7 @@
             <a:fld id="{CE58CB1E-F828-4F11-99E0-327109AF9DA4}" type="slidenum">
               <a:rPr lang="de-DE" smtClean="0"/>
               <a:pPr/>
-              <a:t>‹Nr.›</a:t>
+              <a:t>‹#›</a:t>
             </a:fld>
             <a:endParaRPr lang="de-DE" dirty="0"/>
           </a:p>
@@ -1834,7 +1834,7 @@
             <a:fld id="{CE58CB1E-F828-4F11-99E0-327109AF9DA4}" type="slidenum">
               <a:rPr lang="de-DE" smtClean="0"/>
               <a:pPr/>
-              <a:t>‹Nr.›</a:t>
+              <a:t>‹#›</a:t>
             </a:fld>
             <a:endParaRPr lang="de-DE" dirty="0"/>
           </a:p>
@@ -2033,7 +2033,7 @@
             <a:fld id="{CE58CB1E-F828-4F11-99E0-327109AF9DA4}" type="slidenum">
               <a:rPr lang="de-DE" smtClean="0"/>
               <a:pPr/>
-              <a:t>‹Nr.›</a:t>
+              <a:t>‹#›</a:t>
             </a:fld>
             <a:endParaRPr lang="de-DE" dirty="0"/>
           </a:p>
@@ -2232,7 +2232,7 @@
             <a:fld id="{CE58CB1E-F828-4F11-99E0-327109AF9DA4}" type="slidenum">
               <a:rPr lang="de-DE" smtClean="0"/>
               <a:pPr/>
-              <a:t>‹Nr.›</a:t>
+              <a:t>‹#›</a:t>
             </a:fld>
             <a:endParaRPr lang="de-DE" dirty="0"/>
           </a:p>
@@ -2553,7 +2553,7 @@
             <a:fld id="{CE58CB1E-F828-4F11-99E0-327109AF9DA4}" type="slidenum">
               <a:rPr lang="de-DE" smtClean="0"/>
               <a:pPr/>
-              <a:t>‹Nr.›</a:t>
+              <a:t>‹#›</a:t>
             </a:fld>
             <a:endParaRPr lang="de-DE" dirty="0"/>
           </a:p>
@@ -2729,7 +2729,7 @@
             <a:fld id="{CE58CB1E-F828-4F11-99E0-327109AF9DA4}" type="slidenum">
               <a:rPr lang="de-DE" smtClean="0"/>
               <a:pPr/>
-              <a:t>‹Nr.›</a:t>
+              <a:t>‹#›</a:t>
             </a:fld>
             <a:endParaRPr lang="de-DE" dirty="0"/>
           </a:p>
@@ -3044,7 +3044,7 @@
             <a:fld id="{CE58CB1E-F828-4F11-99E0-327109AF9DA4}" type="slidenum">
               <a:rPr lang="de-DE" smtClean="0"/>
               <a:pPr/>
-              <a:t>‹Nr.›</a:t>
+              <a:t>‹#›</a:t>
             </a:fld>
             <a:endParaRPr lang="de-DE" dirty="0"/>
           </a:p>
@@ -3316,7 +3316,7 @@
             <a:fld id="{CE58CB1E-F828-4F11-99E0-327109AF9DA4}" type="slidenum">
               <a:rPr lang="de-DE" smtClean="0"/>
               <a:pPr/>
-              <a:t>‹Nr.›</a:t>
+              <a:t>‹#›</a:t>
             </a:fld>
             <a:endParaRPr lang="de-DE" dirty="0"/>
           </a:p>
@@ -3503,7 +3503,7 @@
             <a:fld id="{CE58CB1E-F828-4F11-99E0-327109AF9DA4}" type="slidenum">
               <a:rPr lang="de-DE" smtClean="0"/>
               <a:pPr/>
-              <a:t>‹Nr.›</a:t>
+              <a:t>‹#›</a:t>
             </a:fld>
             <a:endParaRPr lang="de-DE" dirty="0"/>
           </a:p>
@@ -3702,7 +3702,7 @@
             <a:fld id="{CE58CB1E-F828-4F11-99E0-327109AF9DA4}" type="slidenum">
               <a:rPr lang="de-DE" smtClean="0"/>
               <a:pPr/>
-              <a:t>‹Nr.›</a:t>
+              <a:t>‹#›</a:t>
             </a:fld>
             <a:endParaRPr lang="de-DE" dirty="0"/>
           </a:p>
@@ -3901,7 +3901,7 @@
             <a:fld id="{CE58CB1E-F828-4F11-99E0-327109AF9DA4}" type="slidenum">
               <a:rPr lang="de-DE" smtClean="0"/>
               <a:pPr/>
-              <a:t>‹Nr.›</a:t>
+              <a:t>‹#›</a:t>
             </a:fld>
             <a:endParaRPr lang="de-DE" dirty="0"/>
           </a:p>
@@ -3986,7 +3986,7 @@
             <a:fld id="{CE58CB1E-F828-4F11-99E0-327109AF9DA4}" type="slidenum">
               <a:rPr lang="de-DE" smtClean="0"/>
               <a:pPr/>
-              <a:t>‹Nr.›</a:t>
+              <a:t>‹#›</a:t>
             </a:fld>
             <a:endParaRPr lang="de-DE" dirty="0"/>
           </a:p>
@@ -4267,7 +4267,7 @@
             <a:fld id="{CE58CB1E-F828-4F11-99E0-327109AF9DA4}" type="slidenum">
               <a:rPr lang="de-DE" smtClean="0"/>
               <a:pPr/>
-              <a:t>‹Nr.›</a:t>
+              <a:t>‹#›</a:t>
             </a:fld>
             <a:endParaRPr lang="de-DE" dirty="0"/>
           </a:p>
@@ -4478,7 +4478,7 @@
             <a:fld id="{CE58CB1E-F828-4F11-99E0-327109AF9DA4}" type="slidenum">
               <a:rPr lang="de-DE" smtClean="0"/>
               <a:pPr/>
-              <a:t>‹Nr.›</a:t>
+              <a:t>‹#›</a:t>
             </a:fld>
             <a:endParaRPr lang="de-DE" dirty="0"/>
           </a:p>
@@ -4677,7 +4677,7 @@
             <a:fld id="{CE58CB1E-F828-4F11-99E0-327109AF9DA4}" type="slidenum">
               <a:rPr lang="de-DE" smtClean="0"/>
               <a:pPr/>
-              <a:t>‹Nr.›</a:t>
+              <a:t>‹#›</a:t>
             </a:fld>
             <a:endParaRPr lang="de-DE" dirty="0"/>
           </a:p>
@@ -4853,7 +4853,7 @@
             <a:fld id="{CE58CB1E-F828-4F11-99E0-327109AF9DA4}" type="slidenum">
               <a:rPr lang="de-DE" smtClean="0"/>
               <a:pPr/>
-              <a:t>‹Nr.›</a:t>
+              <a:t>‹#›</a:t>
             </a:fld>
             <a:endParaRPr lang="de-DE" dirty="0"/>
           </a:p>
@@ -5222,7 +5222,7 @@
             <a:fld id="{CE58CB1E-F828-4F11-99E0-327109AF9DA4}" type="slidenum">
               <a:rPr lang="de-DE" smtClean="0"/>
               <a:pPr/>
-              <a:t>‹Nr.›</a:t>
+              <a:t>‹#›</a:t>
             </a:fld>
             <a:endParaRPr lang="de-DE" dirty="0"/>
           </a:p>
@@ -5421,7 +5421,7 @@
             <a:fld id="{CE58CB1E-F828-4F11-99E0-327109AF9DA4}" type="slidenum">
               <a:rPr lang="de-DE" smtClean="0"/>
               <a:pPr/>
-              <a:t>‹Nr.›</a:t>
+              <a:t>‹#›</a:t>
             </a:fld>
             <a:endParaRPr lang="de-DE" dirty="0"/>
           </a:p>
@@ -5645,7 +5645,7 @@
             <a:fld id="{CE58CB1E-F828-4F11-99E0-327109AF9DA4}" type="slidenum">
               <a:rPr lang="de-DE" smtClean="0"/>
               <a:pPr/>
-              <a:t>‹Nr.›</a:t>
+              <a:t>‹#›</a:t>
             </a:fld>
             <a:endParaRPr lang="de-DE" dirty="0"/>
           </a:p>
@@ -5882,7 +5882,7 @@
             <a:fld id="{CE58CB1E-F828-4F11-99E0-327109AF9DA4}" type="slidenum">
               <a:rPr lang="de-DE" smtClean="0"/>
               <a:pPr/>
-              <a:t>‹Nr.›</a:t>
+              <a:t>‹#›</a:t>
             </a:fld>
             <a:endParaRPr lang="de-DE" dirty="0"/>
           </a:p>
@@ -6360,7 +6360,7 @@
                   <a:spcPct val="114000"/>
                 </a:lnSpc>
               </a:pPr>
-              <a:t>‹Nr.›</a:t>
+              <a:t>‹#›</a:t>
             </a:fld>
             <a:endParaRPr lang="de-DE" sz="1200" dirty="0">
               <a:latin typeface="+mn-lt"/>
@@ -6452,7 +6452,7 @@
             <a:fld id="{CE58CB1E-F828-4F11-99E0-327109AF9DA4}" type="slidenum">
               <a:rPr lang="de-DE" noProof="0" smtClean="0"/>
               <a:pPr/>
-              <a:t>‹Nr.›</a:t>
+              <a:t>‹#›</a:t>
             </a:fld>
             <a:endParaRPr lang="de-DE" noProof="0"/>
           </a:p>
@@ -6966,7 +6966,7 @@
             <a:fld id="{CE58CB1E-F828-4F11-99E0-327109AF9DA4}" type="slidenum">
               <a:rPr lang="de-DE" smtClean="0"/>
               <a:pPr/>
-              <a:t>‹Nr.›</a:t>
+              <a:t>‹#›</a:t>
             </a:fld>
             <a:endParaRPr lang="de-DE" dirty="0"/>
           </a:p>
@@ -7642,7 +7642,7 @@
             <a:fld id="{CE58CB1E-F828-4F11-99E0-327109AF9DA4}" type="slidenum">
               <a:rPr lang="de-DE" smtClean="0"/>
               <a:pPr/>
-              <a:t>‹Nr.›</a:t>
+              <a:t>‹#›</a:t>
             </a:fld>
             <a:endParaRPr lang="de-DE" dirty="0"/>
           </a:p>
@@ -8239,7 +8239,7 @@
             <a:fld id="{CE58CB1E-F828-4F11-99E0-327109AF9DA4}" type="slidenum">
               <a:rPr lang="de-DE" smtClean="0"/>
               <a:pPr/>
-              <a:t>‹Nr.›</a:t>
+              <a:t>‹#›</a:t>
             </a:fld>
             <a:endParaRPr lang="de-DE" dirty="0"/>
           </a:p>
@@ -8836,7 +8836,7 @@
             <a:fld id="{CE58CB1E-F828-4F11-99E0-327109AF9DA4}" type="slidenum">
               <a:rPr lang="de-DE" smtClean="0"/>
               <a:pPr/>
-              <a:t>‹Nr.›</a:t>
+              <a:t>‹#›</a:t>
             </a:fld>
             <a:endParaRPr lang="de-DE" dirty="0"/>
           </a:p>
@@ -10993,12 +10993,237 @@
           </a:p>
         </p:txBody>
       </p:sp>
+      <p:sp>
+        <p:nvSpPr>
+          <p:cNvPr id="13" name="TextBox 12">
+            <a:extLst>
+              <a:ext uri="{FF2B5EF4-FFF2-40B4-BE49-F238E27FC236}">
+                <a16:creationId xmlns:a16="http://schemas.microsoft.com/office/drawing/2014/main" id="{FD7E47CA-3175-0D7E-C47B-A4EDAFBFA617}"/>
+              </a:ext>
+            </a:extLst>
+          </p:cNvPr>
+          <p:cNvSpPr txBox="1"/>
+          <p:nvPr/>
+        </p:nvSpPr>
+        <p:spPr>
+          <a:xfrm>
+            <a:off x="517035" y="5826982"/>
+            <a:ext cx="7582155" cy="646331"/>
+          </a:xfrm>
+          <a:prstGeom prst="rect">
+            <a:avLst/>
+          </a:prstGeom>
+          <a:noFill/>
+        </p:spPr>
+        <p:txBody>
+          <a:bodyPr wrap="square">
+            <a:spAutoFit/>
+          </a:bodyPr>
+          <a:lstStyle/>
+          <a:p>
+            <a:r>
+              <a:rPr lang="pt-BR" altLang="zh-CN" b="0" dirty="0">
+                <a:solidFill>
+                  <a:srgbClr val="A31515"/>
+                </a:solidFill>
+                <a:effectLst/>
+                <a:highlight>
+                  <a:srgbClr val="FFFFFF"/>
+                </a:highlight>
+                <a:latin typeface="Consolas" panose="020B0609020204030204" pitchFamily="49" charset="0"/>
+              </a:rPr>
+              <a:t>Different combinations of training set/test set:</a:t>
+            </a:r>
+          </a:p>
+          <a:p>
+            <a:r>
+              <a:rPr lang="pt-BR" altLang="zh-CN" b="0" dirty="0">
+                <a:solidFill>
+                  <a:srgbClr val="A31515"/>
+                </a:solidFill>
+                <a:effectLst/>
+                <a:highlight>
+                  <a:srgbClr val="FFFFFF"/>
+                </a:highlight>
+                <a:latin typeface="Consolas" panose="020B0609020204030204" pitchFamily="49" charset="0"/>
+              </a:rPr>
+              <a:t>'R/R'</a:t>
+            </a:r>
+            <a:r>
+              <a:rPr lang="pt-BR" altLang="zh-CN" b="0" dirty="0">
+                <a:solidFill>
+                  <a:srgbClr val="000000"/>
+                </a:solidFill>
+                <a:effectLst/>
+                <a:highlight>
+                  <a:srgbClr val="FFFFFF"/>
+                </a:highlight>
+                <a:latin typeface="Consolas" panose="020B0609020204030204" pitchFamily="49" charset="0"/>
+              </a:rPr>
+              <a:t>, </a:t>
+            </a:r>
+            <a:r>
+              <a:rPr lang="pt-BR" altLang="zh-CN" b="0" dirty="0">
+                <a:solidFill>
+                  <a:srgbClr val="A31515"/>
+                </a:solidFill>
+                <a:effectLst/>
+                <a:highlight>
+                  <a:srgbClr val="FFFFFF"/>
+                </a:highlight>
+                <a:latin typeface="Consolas" panose="020B0609020204030204" pitchFamily="49" charset="0"/>
+              </a:rPr>
+              <a:t>'B/B'</a:t>
+            </a:r>
+            <a:r>
+              <a:rPr lang="pt-BR" altLang="zh-CN" b="0" dirty="0">
+                <a:solidFill>
+                  <a:srgbClr val="000000"/>
+                </a:solidFill>
+                <a:effectLst/>
+                <a:highlight>
+                  <a:srgbClr val="FFFFFF"/>
+                </a:highlight>
+                <a:latin typeface="Consolas" panose="020B0609020204030204" pitchFamily="49" charset="0"/>
+              </a:rPr>
+              <a:t>, </a:t>
+            </a:r>
+            <a:r>
+              <a:rPr lang="pt-BR" altLang="zh-CN" b="0" dirty="0">
+                <a:solidFill>
+                  <a:srgbClr val="A31515"/>
+                </a:solidFill>
+                <a:effectLst/>
+                <a:highlight>
+                  <a:srgbClr val="FFFFFF"/>
+                </a:highlight>
+                <a:latin typeface="Consolas" panose="020B0609020204030204" pitchFamily="49" charset="0"/>
+              </a:rPr>
+              <a:t>'R/B'</a:t>
+            </a:r>
+            <a:r>
+              <a:rPr lang="pt-BR" altLang="zh-CN" b="0" dirty="0">
+                <a:solidFill>
+                  <a:srgbClr val="000000"/>
+                </a:solidFill>
+                <a:effectLst/>
+                <a:highlight>
+                  <a:srgbClr val="FFFFFF"/>
+                </a:highlight>
+                <a:latin typeface="Consolas" panose="020B0609020204030204" pitchFamily="49" charset="0"/>
+              </a:rPr>
+              <a:t>, </a:t>
+            </a:r>
+            <a:r>
+              <a:rPr lang="pt-BR" altLang="zh-CN" b="0" dirty="0">
+                <a:solidFill>
+                  <a:srgbClr val="A31515"/>
+                </a:solidFill>
+                <a:effectLst/>
+                <a:highlight>
+                  <a:srgbClr val="FFFFFF"/>
+                </a:highlight>
+                <a:latin typeface="Consolas" panose="020B0609020204030204" pitchFamily="49" charset="0"/>
+              </a:rPr>
+              <a:t>'B/R'</a:t>
+            </a:r>
+            <a:r>
+              <a:rPr lang="pt-BR" altLang="zh-CN" b="0" dirty="0">
+                <a:solidFill>
+                  <a:srgbClr val="000000"/>
+                </a:solidFill>
+                <a:effectLst/>
+                <a:highlight>
+                  <a:srgbClr val="FFFFFF"/>
+                </a:highlight>
+                <a:latin typeface="Consolas" panose="020B0609020204030204" pitchFamily="49" charset="0"/>
+              </a:rPr>
+              <a:t>, </a:t>
+            </a:r>
+            <a:r>
+              <a:rPr lang="pt-BR" altLang="zh-CN" b="0" dirty="0">
+                <a:solidFill>
+                  <a:srgbClr val="A31515"/>
+                </a:solidFill>
+                <a:effectLst/>
+                <a:highlight>
+                  <a:srgbClr val="FFFFFF"/>
+                </a:highlight>
+                <a:latin typeface="Consolas" panose="020B0609020204030204" pitchFamily="49" charset="0"/>
+              </a:rPr>
+              <a:t>'R+B/R'</a:t>
+            </a:r>
+            <a:r>
+              <a:rPr lang="pt-BR" altLang="zh-CN" b="0" dirty="0">
+                <a:solidFill>
+                  <a:srgbClr val="000000"/>
+                </a:solidFill>
+                <a:effectLst/>
+                <a:highlight>
+                  <a:srgbClr val="FFFFFF"/>
+                </a:highlight>
+                <a:latin typeface="Consolas" panose="020B0609020204030204" pitchFamily="49" charset="0"/>
+              </a:rPr>
+              <a:t>, </a:t>
+            </a:r>
+            <a:r>
+              <a:rPr lang="pt-BR" altLang="zh-CN" b="0" dirty="0">
+                <a:solidFill>
+                  <a:srgbClr val="A31515"/>
+                </a:solidFill>
+                <a:effectLst/>
+                <a:highlight>
+                  <a:srgbClr val="FFFFFF"/>
+                </a:highlight>
+                <a:latin typeface="Consolas" panose="020B0609020204030204" pitchFamily="49" charset="0"/>
+              </a:rPr>
+              <a:t>'R+B/B'</a:t>
+            </a:r>
+            <a:r>
+              <a:rPr lang="pt-BR" altLang="zh-CN" b="0" dirty="0">
+                <a:solidFill>
+                  <a:srgbClr val="000000"/>
+                </a:solidFill>
+                <a:effectLst/>
+                <a:highlight>
+                  <a:srgbClr val="FFFFFF"/>
+                </a:highlight>
+                <a:latin typeface="Consolas" panose="020B0609020204030204" pitchFamily="49" charset="0"/>
+              </a:rPr>
+              <a:t>, </a:t>
+            </a:r>
+            <a:r>
+              <a:rPr lang="pt-BR" altLang="zh-CN" b="0" dirty="0">
+                <a:solidFill>
+                  <a:srgbClr val="A31515"/>
+                </a:solidFill>
+                <a:effectLst/>
+                <a:highlight>
+                  <a:srgbClr val="FFFFFF"/>
+                </a:highlight>
+                <a:latin typeface="Consolas" panose="020B0609020204030204" pitchFamily="49" charset="0"/>
+              </a:rPr>
+              <a:t>'R+B/R+B'</a:t>
+            </a:r>
+            <a:endParaRPr lang="pt-BR" altLang="zh-CN" b="0" dirty="0">
+              <a:solidFill>
+                <a:srgbClr val="000000"/>
+              </a:solidFill>
+              <a:effectLst/>
+              <a:highlight>
+                <a:srgbClr val="FFFFFF"/>
+              </a:highlight>
+              <a:latin typeface="Consolas" panose="020B0609020204030204" pitchFamily="49" charset="0"/>
+            </a:endParaRPr>
+          </a:p>
+        </p:txBody>
+      </p:sp>
       <p:pic>
         <p:nvPicPr>
-          <p:cNvPr id="6" name="Picture 5">
+          <p:cNvPr id="5" name="Picture 4">
             <a:extLst>
               <a:ext uri="{FF2B5EF4-FFF2-40B4-BE49-F238E27FC236}">
-                <a16:creationId xmlns:a16="http://schemas.microsoft.com/office/drawing/2014/main" id="{1B05C182-C0A3-F1C0-3530-32D9611C1085}"/>
+                <a16:creationId xmlns:a16="http://schemas.microsoft.com/office/drawing/2014/main" id="{C6784B34-D38E-29FB-26F3-1CB91674A8F2}"/>
               </a:ext>
             </a:extLst>
           </p:cNvPr>
@@ -11015,7 +11240,7 @@
         </p:blipFill>
         <p:spPr>
           <a:xfrm>
-            <a:off x="0" y="1951291"/>
+            <a:off x="0" y="1750635"/>
             <a:ext cx="9144000" cy="3654394"/>
           </a:xfrm>
           <a:prstGeom prst="rect">
@@ -11023,231 +11248,6 @@
           </a:prstGeom>
         </p:spPr>
       </p:pic>
-      <p:sp>
-        <p:nvSpPr>
-          <p:cNvPr id="13" name="TextBox 12">
-            <a:extLst>
-              <a:ext uri="{FF2B5EF4-FFF2-40B4-BE49-F238E27FC236}">
-                <a16:creationId xmlns:a16="http://schemas.microsoft.com/office/drawing/2014/main" id="{FD7E47CA-3175-0D7E-C47B-A4EDAFBFA617}"/>
-              </a:ext>
-            </a:extLst>
-          </p:cNvPr>
-          <p:cNvSpPr txBox="1"/>
-          <p:nvPr/>
-        </p:nvSpPr>
-        <p:spPr>
-          <a:xfrm>
-            <a:off x="517035" y="5826982"/>
-            <a:ext cx="7582155" cy="646331"/>
-          </a:xfrm>
-          <a:prstGeom prst="rect">
-            <a:avLst/>
-          </a:prstGeom>
-          <a:noFill/>
-        </p:spPr>
-        <p:txBody>
-          <a:bodyPr wrap="square">
-            <a:spAutoFit/>
-          </a:bodyPr>
-          <a:lstStyle/>
-          <a:p>
-            <a:r>
-              <a:rPr lang="pt-BR" altLang="zh-CN" b="0" dirty="0">
-                <a:solidFill>
-                  <a:srgbClr val="A31515"/>
-                </a:solidFill>
-                <a:effectLst/>
-                <a:highlight>
-                  <a:srgbClr val="FFFFFF"/>
-                </a:highlight>
-                <a:latin typeface="Consolas" panose="020B0609020204030204" pitchFamily="49" charset="0"/>
-              </a:rPr>
-              <a:t>Different combinations of training set/test set:</a:t>
-            </a:r>
-          </a:p>
-          <a:p>
-            <a:r>
-              <a:rPr lang="pt-BR" altLang="zh-CN" b="0" dirty="0">
-                <a:solidFill>
-                  <a:srgbClr val="A31515"/>
-                </a:solidFill>
-                <a:effectLst/>
-                <a:highlight>
-                  <a:srgbClr val="FFFFFF"/>
-                </a:highlight>
-                <a:latin typeface="Consolas" panose="020B0609020204030204" pitchFamily="49" charset="0"/>
-              </a:rPr>
-              <a:t>'R/R'</a:t>
-            </a:r>
-            <a:r>
-              <a:rPr lang="pt-BR" altLang="zh-CN" b="0" dirty="0">
-                <a:solidFill>
-                  <a:srgbClr val="000000"/>
-                </a:solidFill>
-                <a:effectLst/>
-                <a:highlight>
-                  <a:srgbClr val="FFFFFF"/>
-                </a:highlight>
-                <a:latin typeface="Consolas" panose="020B0609020204030204" pitchFamily="49" charset="0"/>
-              </a:rPr>
-              <a:t>, </a:t>
-            </a:r>
-            <a:r>
-              <a:rPr lang="pt-BR" altLang="zh-CN" b="0" dirty="0">
-                <a:solidFill>
-                  <a:srgbClr val="A31515"/>
-                </a:solidFill>
-                <a:effectLst/>
-                <a:highlight>
-                  <a:srgbClr val="FFFFFF"/>
-                </a:highlight>
-                <a:latin typeface="Consolas" panose="020B0609020204030204" pitchFamily="49" charset="0"/>
-              </a:rPr>
-              <a:t>'B/B'</a:t>
-            </a:r>
-            <a:r>
-              <a:rPr lang="pt-BR" altLang="zh-CN" b="0" dirty="0">
-                <a:solidFill>
-                  <a:srgbClr val="000000"/>
-                </a:solidFill>
-                <a:effectLst/>
-                <a:highlight>
-                  <a:srgbClr val="FFFFFF"/>
-                </a:highlight>
-                <a:latin typeface="Consolas" panose="020B0609020204030204" pitchFamily="49" charset="0"/>
-              </a:rPr>
-              <a:t>, </a:t>
-            </a:r>
-            <a:r>
-              <a:rPr lang="pt-BR" altLang="zh-CN" b="0" dirty="0">
-                <a:solidFill>
-                  <a:srgbClr val="A31515"/>
-                </a:solidFill>
-                <a:effectLst/>
-                <a:highlight>
-                  <a:srgbClr val="FFFFFF"/>
-                </a:highlight>
-                <a:latin typeface="Consolas" panose="020B0609020204030204" pitchFamily="49" charset="0"/>
-              </a:rPr>
-              <a:t>'R/B'</a:t>
-            </a:r>
-            <a:r>
-              <a:rPr lang="pt-BR" altLang="zh-CN" b="0" dirty="0">
-                <a:solidFill>
-                  <a:srgbClr val="000000"/>
-                </a:solidFill>
-                <a:effectLst/>
-                <a:highlight>
-                  <a:srgbClr val="FFFFFF"/>
-                </a:highlight>
-                <a:latin typeface="Consolas" panose="020B0609020204030204" pitchFamily="49" charset="0"/>
-              </a:rPr>
-              <a:t>, </a:t>
-            </a:r>
-            <a:r>
-              <a:rPr lang="pt-BR" altLang="zh-CN" b="0" dirty="0">
-                <a:solidFill>
-                  <a:srgbClr val="A31515"/>
-                </a:solidFill>
-                <a:effectLst/>
-                <a:highlight>
-                  <a:srgbClr val="FFFFFF"/>
-                </a:highlight>
-                <a:latin typeface="Consolas" panose="020B0609020204030204" pitchFamily="49" charset="0"/>
-              </a:rPr>
-              <a:t>'B/R'</a:t>
-            </a:r>
-            <a:r>
-              <a:rPr lang="pt-BR" altLang="zh-CN" b="0" dirty="0">
-                <a:solidFill>
-                  <a:srgbClr val="000000"/>
-                </a:solidFill>
-                <a:effectLst/>
-                <a:highlight>
-                  <a:srgbClr val="FFFFFF"/>
-                </a:highlight>
-                <a:latin typeface="Consolas" panose="020B0609020204030204" pitchFamily="49" charset="0"/>
-              </a:rPr>
-              <a:t>, </a:t>
-            </a:r>
-            <a:r>
-              <a:rPr lang="pt-BR" altLang="zh-CN" b="0" dirty="0">
-                <a:solidFill>
-                  <a:srgbClr val="A31515"/>
-                </a:solidFill>
-                <a:effectLst/>
-                <a:highlight>
-                  <a:srgbClr val="FFFFFF"/>
-                </a:highlight>
-                <a:latin typeface="Consolas" panose="020B0609020204030204" pitchFamily="49" charset="0"/>
-              </a:rPr>
-              <a:t>'R+B/R'</a:t>
-            </a:r>
-            <a:r>
-              <a:rPr lang="pt-BR" altLang="zh-CN" b="0" dirty="0">
-                <a:solidFill>
-                  <a:srgbClr val="000000"/>
-                </a:solidFill>
-                <a:effectLst/>
-                <a:highlight>
-                  <a:srgbClr val="FFFFFF"/>
-                </a:highlight>
-                <a:latin typeface="Consolas" panose="020B0609020204030204" pitchFamily="49" charset="0"/>
-              </a:rPr>
-              <a:t>, </a:t>
-            </a:r>
-            <a:r>
-              <a:rPr lang="pt-BR" altLang="zh-CN" b="0" dirty="0">
-                <a:solidFill>
-                  <a:srgbClr val="A31515"/>
-                </a:solidFill>
-                <a:effectLst/>
-                <a:highlight>
-                  <a:srgbClr val="FFFFFF"/>
-                </a:highlight>
-                <a:latin typeface="Consolas" panose="020B0609020204030204" pitchFamily="49" charset="0"/>
-              </a:rPr>
-              <a:t>'R+B/B'</a:t>
-            </a:r>
-            <a:r>
-              <a:rPr lang="pt-BR" altLang="zh-CN" b="0" dirty="0">
-                <a:solidFill>
-                  <a:srgbClr val="000000"/>
-                </a:solidFill>
-                <a:effectLst/>
-                <a:highlight>
-                  <a:srgbClr val="FFFFFF"/>
-                </a:highlight>
-                <a:latin typeface="Consolas" panose="020B0609020204030204" pitchFamily="49" charset="0"/>
-              </a:rPr>
-              <a:t>, </a:t>
-            </a:r>
-            <a:r>
-              <a:rPr lang="pt-BR" altLang="zh-CN" b="0" dirty="0">
-                <a:solidFill>
-                  <a:srgbClr val="A31515"/>
-                </a:solidFill>
-                <a:effectLst/>
-                <a:highlight>
-                  <a:srgbClr val="FFFFFF"/>
-                </a:highlight>
-                <a:latin typeface="Consolas" panose="020B0609020204030204" pitchFamily="49" charset="0"/>
-              </a:rPr>
-              <a:t>'R+B/R+B'</a:t>
-            </a:r>
-            <a:endParaRPr lang="pt-BR" altLang="zh-CN" b="0" dirty="0">
-              <a:solidFill>
-                <a:srgbClr val="000000"/>
-              </a:solidFill>
-              <a:effectLst/>
-              <a:highlight>
-                <a:srgbClr val="FFFFFF"/>
-              </a:highlight>
-              <a:latin typeface="Consolas" panose="020B0609020204030204" pitchFamily="49" charset="0"/>
-            </a:endParaRPr>
-          </a:p>
-        </p:txBody>
-      </p:sp>
     </p:spTree>
   </p:cSld>
   <p:clrMapOvr>
@@ -12157,13 +12157,7 @@
                             <a:rPr lang="de-DE" altLang="zh-CN" b="0" i="1" smtClean="0">
                               <a:latin typeface="Cambria Math" panose="02040503050406030204" pitchFamily="18" charset="0"/>
                             </a:rPr>
-                            <m:t>1</m:t>
-                          </m:r>
-                          <m:r>
-                            <a:rPr lang="de-DE" altLang="zh-CN" b="0" i="1" smtClean="0">
-                              <a:latin typeface="Cambria Math" panose="02040503050406030204" pitchFamily="18" charset="0"/>
-                            </a:rPr>
-                            <m:t>−</m:t>
+                            <m:t>1−</m:t>
                           </m:r>
                           <m:func>
                             <m:funcPr>

</xml_diff>

<commit_message>
update figure pg. 13
</commit_message>
<xml_diff>
--- a/final project/Part_1-2-4.pptx
+++ b/final project/Part_1-2-4.pptx
@@ -11220,10 +11220,10 @@
       </p:sp>
       <p:pic>
         <p:nvPicPr>
-          <p:cNvPr id="5" name="Picture 4">
+          <p:cNvPr id="9" name="Picture 8">
             <a:extLst>
               <a:ext uri="{FF2B5EF4-FFF2-40B4-BE49-F238E27FC236}">
-                <a16:creationId xmlns:a16="http://schemas.microsoft.com/office/drawing/2014/main" id="{C6784B34-D38E-29FB-26F3-1CB91674A8F2}"/>
+                <a16:creationId xmlns:a16="http://schemas.microsoft.com/office/drawing/2014/main" id="{69722A57-93CD-B5A1-8C00-3031C17DE9D3}"/>
               </a:ext>
             </a:extLst>
           </p:cNvPr>
@@ -11240,8 +11240,8 @@
         </p:blipFill>
         <p:spPr>
           <a:xfrm>
-            <a:off x="0" y="1750635"/>
-            <a:ext cx="9144000" cy="3654394"/>
+            <a:off x="0" y="1597796"/>
+            <a:ext cx="9144000" cy="3662408"/>
           </a:xfrm>
           <a:prstGeom prst="rect">
             <a:avLst/>
@@ -12157,7 +12157,13 @@
                             <a:rPr lang="de-DE" altLang="zh-CN" b="0" i="1" smtClean="0">
                               <a:latin typeface="Cambria Math" panose="02040503050406030204" pitchFamily="18" charset="0"/>
                             </a:rPr>
-                            <m:t>1−</m:t>
+                            <m:t>1</m:t>
+                          </m:r>
+                          <m:r>
+                            <a:rPr lang="de-DE" altLang="zh-CN" b="0" i="1" smtClean="0">
+                              <a:latin typeface="Cambria Math" panose="02040503050406030204" pitchFamily="18" charset="0"/>
+                            </a:rPr>
+                            <m:t>−</m:t>
                           </m:r>
                           <m:func>
                             <m:funcPr>
@@ -13907,13 +13913,7 @@
                             <a:rPr lang="de-DE" b="0" i="1" smtClean="0">
                               <a:latin typeface="Cambria Math" panose="02040503050406030204" pitchFamily="18" charset="0"/>
                             </a:rPr>
-                            <m:t>1</m:t>
-                          </m:r>
-                          <m:r>
-                            <a:rPr lang="de-DE" b="0" i="1" smtClean="0">
-                              <a:latin typeface="Cambria Math" panose="02040503050406030204" pitchFamily="18" charset="0"/>
-                            </a:rPr>
-                            <m:t>−</m:t>
+                            <m:t>1−</m:t>
                           </m:r>
                           <m:func>
                             <m:funcPr>

</xml_diff>

<commit_message>
Update figure pg. 14
</commit_message>
<xml_diff>
--- a/final project/Part_1-2-4.pptx
+++ b/final project/Part_1-2-4.pptx
@@ -11495,77 +11495,6 @@
           </a:p>
         </p:txBody>
       </p:sp>
-      <p:pic>
-        <p:nvPicPr>
-          <p:cNvPr id="15" name="Picture 14">
-            <a:extLst>
-              <a:ext uri="{FF2B5EF4-FFF2-40B4-BE49-F238E27FC236}">
-                <a16:creationId xmlns:a16="http://schemas.microsoft.com/office/drawing/2014/main" id="{B5CDCC84-F784-EC78-F9B8-0780832D4DBF}"/>
-              </a:ext>
-            </a:extLst>
-          </p:cNvPr>
-          <p:cNvPicPr>
-            <a:picLocks noChangeAspect="1"/>
-          </p:cNvPicPr>
-          <p:nvPr/>
-        </p:nvPicPr>
-        <p:blipFill rotWithShape="1">
-          <a:blip r:embed="rId4"/>
-          <a:srcRect t="5213"/>
-          <a:stretch/>
-        </p:blipFill>
-        <p:spPr>
-          <a:xfrm>
-            <a:off x="398663" y="3547136"/>
-            <a:ext cx="4621332" cy="3271454"/>
-          </a:xfrm>
-          <a:prstGeom prst="rect">
-            <a:avLst/>
-          </a:prstGeom>
-        </p:spPr>
-      </p:pic>
-      <p:sp>
-        <p:nvSpPr>
-          <p:cNvPr id="17" name="TextBox 16">
-            <a:extLst>
-              <a:ext uri="{FF2B5EF4-FFF2-40B4-BE49-F238E27FC236}">
-                <a16:creationId xmlns:a16="http://schemas.microsoft.com/office/drawing/2014/main" id="{76EECF56-CCE9-F864-66E0-96755C8199AD}"/>
-              </a:ext>
-            </a:extLst>
-          </p:cNvPr>
-          <p:cNvSpPr txBox="1"/>
-          <p:nvPr/>
-        </p:nvSpPr>
-        <p:spPr>
-          <a:xfrm>
-            <a:off x="165697" y="3235906"/>
-            <a:ext cx="5742854" cy="257250"/>
-          </a:xfrm>
-          <a:prstGeom prst="rect">
-            <a:avLst/>
-          </a:prstGeom>
-          <a:noFill/>
-        </p:spPr>
-        <p:txBody>
-          <a:bodyPr wrap="none" lIns="0" tIns="0" rIns="0" bIns="0" rtlCol="0">
-            <a:spAutoFit/>
-          </a:bodyPr>
-          <a:lstStyle/>
-          <a:p>
-            <a:pPr>
-              <a:lnSpc>
-                <a:spcPct val="114000"/>
-              </a:lnSpc>
-            </a:pPr>
-            <a:r>
-              <a:rPr lang="en-US" sz="1600" dirty="0">
-                <a:latin typeface="+mn-lt"/>
-              </a:rPr>
-              <a:t>Test errors of ANN on dataset R+B/R+B w.r.t number of epochs</a:t>
-            </a:r>
-          </a:p>
-        </p:txBody>
-      </p:sp>
       <p:sp>
         <p:nvSpPr>
           <p:cNvPr id="18" name="TextBox 17">
@@ -11608,6 +11537,36 @@
           </a:p>
         </p:txBody>
       </p:sp>
+      <p:pic>
+        <p:nvPicPr>
+          <p:cNvPr id="5" name="Picture 4">
+            <a:extLst>
+              <a:ext uri="{FF2B5EF4-FFF2-40B4-BE49-F238E27FC236}">
+                <a16:creationId xmlns:a16="http://schemas.microsoft.com/office/drawing/2014/main" id="{877FEE35-25B7-B43B-C6D2-EE5B9CB4F264}"/>
+              </a:ext>
+            </a:extLst>
+          </p:cNvPr>
+          <p:cNvPicPr>
+            <a:picLocks noChangeAspect="1"/>
+          </p:cNvPicPr>
+          <p:nvPr/>
+        </p:nvPicPr>
+        <p:blipFill>
+          <a:blip r:embed="rId4"/>
+          <a:stretch>
+            <a:fillRect/>
+          </a:stretch>
+        </p:blipFill>
+        <p:spPr>
+          <a:xfrm>
+            <a:off x="165697" y="3140704"/>
+            <a:ext cx="4796920" cy="3582510"/>
+          </a:xfrm>
+          <a:prstGeom prst="rect">
+            <a:avLst/>
+          </a:prstGeom>
+        </p:spPr>
+      </p:pic>
     </p:spTree>
     <p:extLst>
       <p:ext uri="{BB962C8B-B14F-4D97-AF65-F5344CB8AC3E}">
@@ -13913,7 +13872,13 @@
                             <a:rPr lang="de-DE" b="0" i="1" smtClean="0">
                               <a:latin typeface="Cambria Math" panose="02040503050406030204" pitchFamily="18" charset="0"/>
                             </a:rPr>
-                            <m:t>1−</m:t>
+                            <m:t>1</m:t>
+                          </m:r>
+                          <m:r>
+                            <a:rPr lang="de-DE" b="0" i="1" smtClean="0">
+                              <a:latin typeface="Cambria Math" panose="02040503050406030204" pitchFamily="18" charset="0"/>
+                            </a:rPr>
+                            <m:t>−</m:t>
                           </m:r>
                           <m:func>
                             <m:funcPr>

</xml_diff>